<commit_message>
feat: edited the homepage and create patients profile page, added resources list in the presentation powerpoint
</commit_message>
<xml_diff>
--- a/p5-mern-app/presentationFiles/e-Prescribe app.pptx
+++ b/p5-mern-app/presentationFiles/e-Prescribe app.pptx
@@ -10,8 +10,9 @@
     <p:sldId id="259" r:id="rId4"/>
     <p:sldId id="261" r:id="rId5"/>
     <p:sldId id="262" r:id="rId6"/>
-    <p:sldId id="257" r:id="rId7"/>
-    <p:sldId id="258" r:id="rId8"/>
+    <p:sldId id="263" r:id="rId7"/>
+    <p:sldId id="257" r:id="rId8"/>
+    <p:sldId id="258" r:id="rId9"/>
   </p:sldIdLst>
   <p:sldSz cx="12192000" cy="6858000"/>
   <p:notesSz cx="6858000" cy="9144000"/>
@@ -110,6 +111,11 @@
       </a:defRPr>
     </a:lvl9pPr>
   </p:defaultTextStyle>
+  <p:extLst>
+    <p:ext uri="{EFAFB233-063F-42B5-8137-9DF3F51BA10A}">
+      <p15:sldGuideLst xmlns:p15="http://schemas.microsoft.com/office/powerpoint/2012/main"/>
+    </p:ext>
+  </p:extLst>
 </p:presentation>
 </file>
 
@@ -3334,7 +3340,11 @@
           <a:bodyPr/>
           <a:lstStyle/>
           <a:p>
-            <a:endParaRPr lang="en-PH"/>
+            <a:r>
+              <a:rPr lang="en-PH" dirty="0" smtClean="0"/>
+              <a:t>Resources</a:t>
+            </a:r>
+            <a:endParaRPr lang="en-PH" dirty="0"/>
           </a:p>
         </p:txBody>
       </p:sp>
@@ -3353,7 +3363,14 @@
           <a:bodyPr/>
           <a:lstStyle/>
           <a:p>
-            <a:endParaRPr lang="en-PH"/>
+            <a:pPr marL="0" indent="0">
+              <a:buNone/>
+            </a:pPr>
+            <a:r>
+              <a:rPr lang="en-PH" dirty="0"/>
+              <a:t>Icons - https://icons8.com/</a:t>
+            </a:r>
+            <a:endParaRPr lang="en-PH" dirty="0"/>
           </a:p>
         </p:txBody>
       </p:sp>
@@ -3402,6 +3419,74 @@
           <a:bodyPr/>
           <a:lstStyle/>
           <a:p>
+            <a:endParaRPr lang="en-PH"/>
+          </a:p>
+        </p:txBody>
+      </p:sp>
+      <p:sp>
+        <p:nvSpPr>
+          <p:cNvPr id="3" name="Content Placeholder 2"/>
+          <p:cNvSpPr>
+            <a:spLocks noGrp="1"/>
+          </p:cNvSpPr>
+          <p:nvPr>
+            <p:ph idx="1"/>
+          </p:nvPr>
+        </p:nvSpPr>
+        <p:spPr/>
+        <p:txBody>
+          <a:bodyPr/>
+          <a:lstStyle/>
+          <a:p>
+            <a:endParaRPr lang="en-PH"/>
+          </a:p>
+        </p:txBody>
+      </p:sp>
+    </p:spTree>
+    <p:extLst>
+      <p:ext uri="{BB962C8B-B14F-4D97-AF65-F5344CB8AC3E}">
+        <p14:creationId xmlns:p14="http://schemas.microsoft.com/office/powerpoint/2010/main" val="1054607159"/>
+      </p:ext>
+    </p:extLst>
+  </p:cSld>
+  <p:clrMapOvr>
+    <a:masterClrMapping/>
+  </p:clrMapOvr>
+</p:sld>
+</file>
+
+<file path=ppt/slides/slide7.xml><?xml version="1.0" encoding="utf-8"?>
+<p:sld xmlns:a="http://schemas.openxmlformats.org/drawingml/2006/main" xmlns:r="http://schemas.openxmlformats.org/officeDocument/2006/relationships" xmlns:p="http://schemas.openxmlformats.org/presentationml/2006/main">
+  <p:cSld>
+    <p:spTree>
+      <p:nvGrpSpPr>
+        <p:cNvPr id="1" name=""/>
+        <p:cNvGrpSpPr/>
+        <p:nvPr/>
+      </p:nvGrpSpPr>
+      <p:grpSpPr>
+        <a:xfrm>
+          <a:off x="0" y="0"/>
+          <a:ext cx="0" cy="0"/>
+          <a:chOff x="0" y="0"/>
+          <a:chExt cx="0" cy="0"/>
+        </a:xfrm>
+      </p:grpSpPr>
+      <p:sp>
+        <p:nvSpPr>
+          <p:cNvPr id="2" name="Title 1"/>
+          <p:cNvSpPr>
+            <a:spLocks noGrp="1"/>
+          </p:cNvSpPr>
+          <p:nvPr>
+            <p:ph type="title"/>
+          </p:nvPr>
+        </p:nvSpPr>
+        <p:spPr/>
+        <p:txBody>
+          <a:bodyPr/>
+          <a:lstStyle/>
+          <a:p>
             <a:r>
               <a:rPr lang="en-PH" dirty="0" smtClean="0"/>
               <a:t>Struggles</a:t>
@@ -3448,7 +3533,7 @@
 </p:sld>
 </file>
 
-<file path=ppt/slides/slide7.xml><?xml version="1.0" encoding="utf-8"?>
+<file path=ppt/slides/slide8.xml><?xml version="1.0" encoding="utf-8"?>
 <p:sld xmlns:a="http://schemas.openxmlformats.org/drawingml/2006/main" xmlns:r="http://schemas.openxmlformats.org/officeDocument/2006/relationships" xmlns:p="http://schemas.openxmlformats.org/presentationml/2006/main">
   <p:cSld>
     <p:spTree>

</xml_diff>

<commit_message>
feat: coding the frontend
</commit_message>
<xml_diff>
--- a/p5-mern-app/presentationFiles/e-Prescribe app.pptx
+++ b/p5-mern-app/presentationFiles/e-Prescribe app.pptx
@@ -251,7 +251,7 @@
           <a:p>
             <a:fld id="{0BA76126-0F93-4C9A-9DDD-5A926ACEB66A}" type="datetimeFigureOut">
               <a:rPr lang="en-PH" smtClean="0"/>
-              <a:t>19/11/2022</a:t>
+              <a:t>22/11/2022</a:t>
             </a:fld>
             <a:endParaRPr lang="en-PH"/>
           </a:p>
@@ -421,7 +421,7 @@
           <a:p>
             <a:fld id="{0BA76126-0F93-4C9A-9DDD-5A926ACEB66A}" type="datetimeFigureOut">
               <a:rPr lang="en-PH" smtClean="0"/>
-              <a:t>19/11/2022</a:t>
+              <a:t>22/11/2022</a:t>
             </a:fld>
             <a:endParaRPr lang="en-PH"/>
           </a:p>
@@ -601,7 +601,7 @@
           <a:p>
             <a:fld id="{0BA76126-0F93-4C9A-9DDD-5A926ACEB66A}" type="datetimeFigureOut">
               <a:rPr lang="en-PH" smtClean="0"/>
-              <a:t>19/11/2022</a:t>
+              <a:t>22/11/2022</a:t>
             </a:fld>
             <a:endParaRPr lang="en-PH"/>
           </a:p>
@@ -771,7 +771,7 @@
           <a:p>
             <a:fld id="{0BA76126-0F93-4C9A-9DDD-5A926ACEB66A}" type="datetimeFigureOut">
               <a:rPr lang="en-PH" smtClean="0"/>
-              <a:t>19/11/2022</a:t>
+              <a:t>22/11/2022</a:t>
             </a:fld>
             <a:endParaRPr lang="en-PH"/>
           </a:p>
@@ -1017,7 +1017,7 @@
           <a:p>
             <a:fld id="{0BA76126-0F93-4C9A-9DDD-5A926ACEB66A}" type="datetimeFigureOut">
               <a:rPr lang="en-PH" smtClean="0"/>
-              <a:t>19/11/2022</a:t>
+              <a:t>22/11/2022</a:t>
             </a:fld>
             <a:endParaRPr lang="en-PH"/>
           </a:p>
@@ -1249,7 +1249,7 @@
           <a:p>
             <a:fld id="{0BA76126-0F93-4C9A-9DDD-5A926ACEB66A}" type="datetimeFigureOut">
               <a:rPr lang="en-PH" smtClean="0"/>
-              <a:t>19/11/2022</a:t>
+              <a:t>22/11/2022</a:t>
             </a:fld>
             <a:endParaRPr lang="en-PH"/>
           </a:p>
@@ -1616,7 +1616,7 @@
           <a:p>
             <a:fld id="{0BA76126-0F93-4C9A-9DDD-5A926ACEB66A}" type="datetimeFigureOut">
               <a:rPr lang="en-PH" smtClean="0"/>
-              <a:t>19/11/2022</a:t>
+              <a:t>22/11/2022</a:t>
             </a:fld>
             <a:endParaRPr lang="en-PH"/>
           </a:p>
@@ -1734,7 +1734,7 @@
           <a:p>
             <a:fld id="{0BA76126-0F93-4C9A-9DDD-5A926ACEB66A}" type="datetimeFigureOut">
               <a:rPr lang="en-PH" smtClean="0"/>
-              <a:t>19/11/2022</a:t>
+              <a:t>22/11/2022</a:t>
             </a:fld>
             <a:endParaRPr lang="en-PH"/>
           </a:p>
@@ -1829,7 +1829,7 @@
           <a:p>
             <a:fld id="{0BA76126-0F93-4C9A-9DDD-5A926ACEB66A}" type="datetimeFigureOut">
               <a:rPr lang="en-PH" smtClean="0"/>
-              <a:t>19/11/2022</a:t>
+              <a:t>22/11/2022</a:t>
             </a:fld>
             <a:endParaRPr lang="en-PH"/>
           </a:p>
@@ -2106,7 +2106,7 @@
           <a:p>
             <a:fld id="{0BA76126-0F93-4C9A-9DDD-5A926ACEB66A}" type="datetimeFigureOut">
               <a:rPr lang="en-PH" smtClean="0"/>
-              <a:t>19/11/2022</a:t>
+              <a:t>22/11/2022</a:t>
             </a:fld>
             <a:endParaRPr lang="en-PH"/>
           </a:p>
@@ -2359,7 +2359,7 @@
           <a:p>
             <a:fld id="{0BA76126-0F93-4C9A-9DDD-5A926ACEB66A}" type="datetimeFigureOut">
               <a:rPr lang="en-PH" smtClean="0"/>
-              <a:t>19/11/2022</a:t>
+              <a:t>22/11/2022</a:t>
             </a:fld>
             <a:endParaRPr lang="en-PH"/>
           </a:p>
@@ -2572,7 +2572,7 @@
           <a:p>
             <a:fld id="{0BA76126-0F93-4C9A-9DDD-5A926ACEB66A}" type="datetimeFigureOut">
               <a:rPr lang="en-PH" smtClean="0"/>
-              <a:t>19/11/2022</a:t>
+              <a:t>22/11/2022</a:t>
             </a:fld>
             <a:endParaRPr lang="en-PH"/>
           </a:p>
@@ -3187,9 +3187,11 @@
           <a:lstStyle/>
           <a:p>
             <a:r>
-              <a:rPr lang="en-PH" dirty="0" smtClean="0"/>
-              <a:t>I limited the colors to only 3 colors, that way I can </a:t>
-            </a:r>
+              <a:rPr lang="en-PH" smtClean="0"/>
+              <a:t>Colors: Shades of Green and Red</a:t>
+            </a:r>
+          </a:p>
+          <a:p>
             <a:endParaRPr lang="en-PH" dirty="0"/>
           </a:p>
         </p:txBody>

</xml_diff>

<commit_message>
feat: adding presentation notes
</commit_message>
<xml_diff>
--- a/p5-mern-app/presentationFiles/e-Prescribe app.pptx
+++ b/p5-mern-app/presentationFiles/e-Prescribe app.pptx
@@ -5,15 +5,7 @@
     <p:sldMasterId id="2147483648" r:id="rId1"/>
   </p:sldMasterIdLst>
   <p:sldIdLst>
-    <p:sldId id="256" r:id="rId2"/>
-    <p:sldId id="260" r:id="rId3"/>
-    <p:sldId id="259" r:id="rId4"/>
-    <p:sldId id="261" r:id="rId5"/>
-    <p:sldId id="262" r:id="rId6"/>
-    <p:sldId id="263" r:id="rId7"/>
-    <p:sldId id="264" r:id="rId8"/>
-    <p:sldId id="257" r:id="rId9"/>
-    <p:sldId id="258" r:id="rId10"/>
+    <p:sldId id="257" r:id="rId2"/>
   </p:sldIdLst>
   <p:sldSz cx="12192000" cy="6858000"/>
   <p:notesSz cx="6858000" cy="9144000"/>
@@ -251,7 +243,7 @@
           <a:p>
             <a:fld id="{0BA76126-0F93-4C9A-9DDD-5A926ACEB66A}" type="datetimeFigureOut">
               <a:rPr lang="en-PH" smtClean="0"/>
-              <a:t>22/11/2022</a:t>
+              <a:t>23/11/2022</a:t>
             </a:fld>
             <a:endParaRPr lang="en-PH"/>
           </a:p>
@@ -421,7 +413,7 @@
           <a:p>
             <a:fld id="{0BA76126-0F93-4C9A-9DDD-5A926ACEB66A}" type="datetimeFigureOut">
               <a:rPr lang="en-PH" smtClean="0"/>
-              <a:t>22/11/2022</a:t>
+              <a:t>23/11/2022</a:t>
             </a:fld>
             <a:endParaRPr lang="en-PH"/>
           </a:p>
@@ -601,7 +593,7 @@
           <a:p>
             <a:fld id="{0BA76126-0F93-4C9A-9DDD-5A926ACEB66A}" type="datetimeFigureOut">
               <a:rPr lang="en-PH" smtClean="0"/>
-              <a:t>22/11/2022</a:t>
+              <a:t>23/11/2022</a:t>
             </a:fld>
             <a:endParaRPr lang="en-PH"/>
           </a:p>
@@ -771,7 +763,7 @@
           <a:p>
             <a:fld id="{0BA76126-0F93-4C9A-9DDD-5A926ACEB66A}" type="datetimeFigureOut">
               <a:rPr lang="en-PH" smtClean="0"/>
-              <a:t>22/11/2022</a:t>
+              <a:t>23/11/2022</a:t>
             </a:fld>
             <a:endParaRPr lang="en-PH"/>
           </a:p>
@@ -1017,7 +1009,7 @@
           <a:p>
             <a:fld id="{0BA76126-0F93-4C9A-9DDD-5A926ACEB66A}" type="datetimeFigureOut">
               <a:rPr lang="en-PH" smtClean="0"/>
-              <a:t>22/11/2022</a:t>
+              <a:t>23/11/2022</a:t>
             </a:fld>
             <a:endParaRPr lang="en-PH"/>
           </a:p>
@@ -1249,7 +1241,7 @@
           <a:p>
             <a:fld id="{0BA76126-0F93-4C9A-9DDD-5A926ACEB66A}" type="datetimeFigureOut">
               <a:rPr lang="en-PH" smtClean="0"/>
-              <a:t>22/11/2022</a:t>
+              <a:t>23/11/2022</a:t>
             </a:fld>
             <a:endParaRPr lang="en-PH"/>
           </a:p>
@@ -1616,7 +1608,7 @@
           <a:p>
             <a:fld id="{0BA76126-0F93-4C9A-9DDD-5A926ACEB66A}" type="datetimeFigureOut">
               <a:rPr lang="en-PH" smtClean="0"/>
-              <a:t>22/11/2022</a:t>
+              <a:t>23/11/2022</a:t>
             </a:fld>
             <a:endParaRPr lang="en-PH"/>
           </a:p>
@@ -1734,7 +1726,7 @@
           <a:p>
             <a:fld id="{0BA76126-0F93-4C9A-9DDD-5A926ACEB66A}" type="datetimeFigureOut">
               <a:rPr lang="en-PH" smtClean="0"/>
-              <a:t>22/11/2022</a:t>
+              <a:t>23/11/2022</a:t>
             </a:fld>
             <a:endParaRPr lang="en-PH"/>
           </a:p>
@@ -1829,7 +1821,7 @@
           <a:p>
             <a:fld id="{0BA76126-0F93-4C9A-9DDD-5A926ACEB66A}" type="datetimeFigureOut">
               <a:rPr lang="en-PH" smtClean="0"/>
-              <a:t>22/11/2022</a:t>
+              <a:t>23/11/2022</a:t>
             </a:fld>
             <a:endParaRPr lang="en-PH"/>
           </a:p>
@@ -2106,7 +2098,7 @@
           <a:p>
             <a:fld id="{0BA76126-0F93-4C9A-9DDD-5A926ACEB66A}" type="datetimeFigureOut">
               <a:rPr lang="en-PH" smtClean="0"/>
-              <a:t>22/11/2022</a:t>
+              <a:t>23/11/2022</a:t>
             </a:fld>
             <a:endParaRPr lang="en-PH"/>
           </a:p>
@@ -2359,7 +2351,7 @@
           <a:p>
             <a:fld id="{0BA76126-0F93-4C9A-9DDD-5A926ACEB66A}" type="datetimeFigureOut">
               <a:rPr lang="en-PH" smtClean="0"/>
-              <a:t>22/11/2022</a:t>
+              <a:t>23/11/2022</a:t>
             </a:fld>
             <a:endParaRPr lang="en-PH"/>
           </a:p>
@@ -2572,7 +2564,7 @@
           <a:p>
             <a:fld id="{0BA76126-0F93-4C9A-9DDD-5A926ACEB66A}" type="datetimeFigureOut">
               <a:rPr lang="en-PH" smtClean="0"/>
-              <a:t>22/11/2022</a:t>
+              <a:t>23/11/2022</a:t>
             </a:fld>
             <a:endParaRPr lang="en-PH"/>
           </a:p>
@@ -2979,53 +2971,71 @@
       </p:grpSpPr>
       <p:sp>
         <p:nvSpPr>
-          <p:cNvPr id="2" name="Title 1"/>
-          <p:cNvSpPr>
-            <a:spLocks noGrp="1"/>
-          </p:cNvSpPr>
-          <p:nvPr>
-            <p:ph type="ctrTitle"/>
-          </p:nvPr>
-        </p:nvSpPr>
-        <p:spPr/>
-        <p:txBody>
-          <a:bodyPr/>
-          <a:lstStyle/>
-          <a:p>
-            <a:r>
-              <a:rPr lang="en-PH" dirty="0" smtClean="0"/>
-              <a:t>e-Prescribe app</a:t>
-            </a:r>
-            <a:endParaRPr lang="en-PH" dirty="0"/>
-          </a:p>
-        </p:txBody>
-      </p:sp>
-      <p:sp>
-        <p:nvSpPr>
-          <p:cNvPr id="3" name="Subtitle 2"/>
-          <p:cNvSpPr>
-            <a:spLocks noGrp="1"/>
-          </p:cNvSpPr>
-          <p:nvPr>
-            <p:ph type="subTitle" idx="1"/>
+          <p:cNvPr id="3" name="Content Placeholder 2"/>
+          <p:cNvSpPr>
+            <a:spLocks noGrp="1"/>
+          </p:cNvSpPr>
+          <p:nvPr>
+            <p:ph idx="1"/>
           </p:nvPr>
         </p:nvSpPr>
         <p:spPr>
           <a:xfrm>
-            <a:off x="1524000" y="3509963"/>
-            <a:ext cx="9144000" cy="1529969"/>
+            <a:off x="838200" y="626772"/>
+            <a:ext cx="10515600" cy="5550191"/>
           </a:xfrm>
         </p:spPr>
         <p:txBody>
           <a:bodyPr>
-            <a:normAutofit/>
+            <a:normAutofit fontScale="62500" lnSpcReduction="20000"/>
           </a:bodyPr>
           <a:lstStyle/>
           <a:p>
             <a:r>
-              <a:rPr lang="en-PH" dirty="0" smtClean="0"/>
-              <a:t>e-Prescribe is an innovative electronic prescribing system that helps physicians and pharmacists to deliver their prescription electronically. It is secured and convenient.</a:t>
-            </a:r>
+              <a:rPr lang="en-PH" dirty="0"/>
+              <a:t>  Project app description - e-Prescribe is an electronic system for prescriptions. This is to avoid misinterpretation of medication due to the illegible handwriting of the physician. This can also improve the old-school way of handling prescription records. </a:t>
+            </a:r>
+          </a:p>
+          <a:p>
+            <a:r>
+              <a:rPr lang="en-PH" dirty="0"/>
+              <a:t>Color Selection: Shades of greens and orange to complement the medical perspectives of the app.</a:t>
+            </a:r>
+          </a:p>
+          <a:p>
+            <a:r>
+              <a:rPr lang="en-PH" dirty="0"/>
+              <a:t> Users - Physicians &amp; Admissions</a:t>
+            </a:r>
+          </a:p>
+          <a:p>
+            <a:r>
+              <a:rPr lang="en-PH" dirty="0"/>
+              <a:t> Process: First, admissions will create the profile of the patients, the profile should contain personal information, and physical information such as weight, height, and vital signs. these are the primary information needed by the physician to conclude a prescription in addition to the future findings during the assessment. Then, the patients will be endorsed to the attending physician for further assessment. The physicians will perform necessary assessments and formulate the prescription. The physician will encode the necessary prescriptions using the e-Prescribe app to generate an electronic prescription, and the data of the prescription will be stored in the database for future reference. The system will also store all transactions of the patient so the physician can access the records that might help with the formulation of the medication. The physician will have the option to print the document form of the prescription and /or to send it via email. The document type of the prescription will also be generated with a QR code that is accessible online to access the information but cannot be used for purchase. Upon drug purchase, the pharmacy will safe keep the original prescription so to avoid abuse of drug purchases. </a:t>
+            </a:r>
+          </a:p>
+          <a:p>
+            <a:r>
+              <a:rPr lang="en-PH" dirty="0"/>
+              <a:t>Struggles: Connecting frontend to DB, dealt with imposters syndrome, procrastination, and time allowance. </a:t>
+            </a:r>
+          </a:p>
+          <a:p>
+            <a:r>
+              <a:rPr lang="en-PH" dirty="0"/>
+              <a:t>Learnings: Planning, Defining the Wireframes, ERD, UML, and User stories are very important to draw the right workflow for the project. I also learned to ask for help :).</a:t>
+            </a:r>
+          </a:p>
+          <a:p>
+            <a:r>
+              <a:rPr lang="en-PH" dirty="0"/>
+              <a:t>Some functionalities are not yet working but rest assured, I will be deploying this app as a fullstack one.</a:t>
+            </a:r>
+          </a:p>
+          <a:p>
+            <a:pPr marL="0" indent="0">
+              <a:buNone/>
+            </a:pPr>
             <a:endParaRPr lang="en-PH" dirty="0"/>
           </a:p>
         </p:txBody>
@@ -3033,659 +3043,7 @@
     </p:spTree>
     <p:extLst>
       <p:ext uri="{BB962C8B-B14F-4D97-AF65-F5344CB8AC3E}">
-        <p14:creationId xmlns:p14="http://schemas.microsoft.com/office/powerpoint/2010/main" val="1667197972"/>
-      </p:ext>
-    </p:extLst>
-  </p:cSld>
-  <p:clrMapOvr>
-    <a:masterClrMapping/>
-  </p:clrMapOvr>
-</p:sld>
-</file>
-
-<file path=ppt/slides/slide2.xml><?xml version="1.0" encoding="utf-8"?>
-<p:sld xmlns:a="http://schemas.openxmlformats.org/drawingml/2006/main" xmlns:r="http://schemas.openxmlformats.org/officeDocument/2006/relationships" xmlns:p="http://schemas.openxmlformats.org/presentationml/2006/main">
-  <p:cSld>
-    <p:spTree>
-      <p:nvGrpSpPr>
-        <p:cNvPr id="1" name=""/>
-        <p:cNvGrpSpPr/>
-        <p:nvPr/>
-      </p:nvGrpSpPr>
-      <p:grpSpPr>
-        <a:xfrm>
-          <a:off x="0" y="0"/>
-          <a:ext cx="0" cy="0"/>
-          <a:chOff x="0" y="0"/>
-          <a:chExt cx="0" cy="0"/>
-        </a:xfrm>
-      </p:grpSpPr>
-      <p:sp>
-        <p:nvSpPr>
-          <p:cNvPr id="2" name="Title 1"/>
-          <p:cNvSpPr>
-            <a:spLocks noGrp="1"/>
-          </p:cNvSpPr>
-          <p:nvPr>
-            <p:ph type="title"/>
-          </p:nvPr>
-        </p:nvSpPr>
-        <p:spPr/>
-        <p:txBody>
-          <a:bodyPr/>
-          <a:lstStyle/>
-          <a:p>
-            <a:r>
-              <a:rPr lang="en-PH" dirty="0" smtClean="0"/>
-              <a:t>Workflow( Business Process)</a:t>
-            </a:r>
-            <a:endParaRPr lang="en-PH" dirty="0"/>
-          </a:p>
-        </p:txBody>
-      </p:sp>
-      <p:sp>
-        <p:nvSpPr>
-          <p:cNvPr id="3" name="Content Placeholder 2"/>
-          <p:cNvSpPr>
-            <a:spLocks noGrp="1"/>
-          </p:cNvSpPr>
-          <p:nvPr>
-            <p:ph idx="1"/>
-          </p:nvPr>
-        </p:nvSpPr>
-        <p:spPr/>
-        <p:txBody>
-          <a:bodyPr/>
-          <a:lstStyle/>
-          <a:p>
-            <a:r>
-              <a:rPr lang="en-PH" dirty="0" smtClean="0"/>
-              <a:t>1. The receiving department will create a patients profile inclding history and current signs observed and symptons expressed by the patient.</a:t>
-            </a:r>
-          </a:p>
-          <a:p>
-            <a:r>
-              <a:rPr lang="en-PH" dirty="0" smtClean="0"/>
-              <a:t>2. The doctor can access the patient’s record via his computer with  respect to the queue.</a:t>
-            </a:r>
-          </a:p>
-          <a:p>
-            <a:r>
-              <a:rPr lang="en-PH" dirty="0" smtClean="0"/>
-              <a:t>3. The doctor shoould confirm the identity of the patient by asking their name and sy</a:t>
-            </a:r>
-            <a:endParaRPr lang="en-PH" dirty="0"/>
-          </a:p>
-        </p:txBody>
-      </p:sp>
-    </p:spTree>
-    <p:extLst>
-      <p:ext uri="{BB962C8B-B14F-4D97-AF65-F5344CB8AC3E}">
-        <p14:creationId xmlns:p14="http://schemas.microsoft.com/office/powerpoint/2010/main" val="1044466269"/>
-      </p:ext>
-    </p:extLst>
-  </p:cSld>
-  <p:clrMapOvr>
-    <a:masterClrMapping/>
-  </p:clrMapOvr>
-</p:sld>
-</file>
-
-<file path=ppt/slides/slide3.xml><?xml version="1.0" encoding="utf-8"?>
-<p:sld xmlns:a="http://schemas.openxmlformats.org/drawingml/2006/main" xmlns:r="http://schemas.openxmlformats.org/officeDocument/2006/relationships" xmlns:p="http://schemas.openxmlformats.org/presentationml/2006/main">
-  <p:cSld>
-    <p:spTree>
-      <p:nvGrpSpPr>
-        <p:cNvPr id="1" name=""/>
-        <p:cNvGrpSpPr/>
-        <p:nvPr/>
-      </p:nvGrpSpPr>
-      <p:grpSpPr>
-        <a:xfrm>
-          <a:off x="0" y="0"/>
-          <a:ext cx="0" cy="0"/>
-          <a:chOff x="0" y="0"/>
-          <a:chExt cx="0" cy="0"/>
-        </a:xfrm>
-      </p:grpSpPr>
-      <p:sp>
-        <p:nvSpPr>
-          <p:cNvPr id="2" name="Title 1"/>
-          <p:cNvSpPr>
-            <a:spLocks noGrp="1"/>
-          </p:cNvSpPr>
-          <p:nvPr>
-            <p:ph type="title"/>
-          </p:nvPr>
-        </p:nvSpPr>
-        <p:spPr/>
-        <p:txBody>
-          <a:bodyPr/>
-          <a:lstStyle/>
-          <a:p>
-            <a:r>
-              <a:rPr lang="en-PH" dirty="0" smtClean="0"/>
-              <a:t>User Interface</a:t>
-            </a:r>
-            <a:endParaRPr lang="en-PH" dirty="0"/>
-          </a:p>
-        </p:txBody>
-      </p:sp>
-      <p:sp>
-        <p:nvSpPr>
-          <p:cNvPr id="3" name="Content Placeholder 2"/>
-          <p:cNvSpPr>
-            <a:spLocks noGrp="1"/>
-          </p:cNvSpPr>
-          <p:nvPr>
-            <p:ph idx="1"/>
-          </p:nvPr>
-        </p:nvSpPr>
-        <p:spPr/>
-        <p:txBody>
-          <a:bodyPr/>
-          <a:lstStyle/>
-          <a:p>
-            <a:r>
-              <a:rPr lang="en-PH" smtClean="0"/>
-              <a:t>Colors: Shades of Green and Red</a:t>
-            </a:r>
-          </a:p>
-          <a:p>
-            <a:endParaRPr lang="en-PH" dirty="0"/>
-          </a:p>
-        </p:txBody>
-      </p:sp>
-    </p:spTree>
-    <p:extLst>
-      <p:ext uri="{BB962C8B-B14F-4D97-AF65-F5344CB8AC3E}">
-        <p14:creationId xmlns:p14="http://schemas.microsoft.com/office/powerpoint/2010/main" val="2013602237"/>
-      </p:ext>
-    </p:extLst>
-  </p:cSld>
-  <p:clrMapOvr>
-    <a:masterClrMapping/>
-  </p:clrMapOvr>
-</p:sld>
-</file>
-
-<file path=ppt/slides/slide4.xml><?xml version="1.0" encoding="utf-8"?>
-<p:sld xmlns:a="http://schemas.openxmlformats.org/drawingml/2006/main" xmlns:r="http://schemas.openxmlformats.org/officeDocument/2006/relationships" xmlns:p="http://schemas.openxmlformats.org/presentationml/2006/main">
-  <p:cSld>
-    <p:spTree>
-      <p:nvGrpSpPr>
-        <p:cNvPr id="1" name=""/>
-        <p:cNvGrpSpPr/>
-        <p:nvPr/>
-      </p:nvGrpSpPr>
-      <p:grpSpPr>
-        <a:xfrm>
-          <a:off x="0" y="0"/>
-          <a:ext cx="0" cy="0"/>
-          <a:chOff x="0" y="0"/>
-          <a:chExt cx="0" cy="0"/>
-        </a:xfrm>
-      </p:grpSpPr>
-      <p:sp>
-        <p:nvSpPr>
-          <p:cNvPr id="2" name="Title 1"/>
-          <p:cNvSpPr>
-            <a:spLocks noGrp="1"/>
-          </p:cNvSpPr>
-          <p:nvPr>
-            <p:ph type="title"/>
-          </p:nvPr>
-        </p:nvSpPr>
-        <p:spPr/>
-        <p:txBody>
-          <a:bodyPr/>
-          <a:lstStyle/>
-          <a:p>
-            <a:r>
-              <a:rPr lang="en-PH" dirty="0" smtClean="0"/>
-              <a:t>Pages</a:t>
-            </a:r>
-            <a:endParaRPr lang="en-PH" dirty="0"/>
-          </a:p>
-        </p:txBody>
-      </p:sp>
-      <p:sp>
-        <p:nvSpPr>
-          <p:cNvPr id="3" name="Content Placeholder 2"/>
-          <p:cNvSpPr>
-            <a:spLocks noGrp="1"/>
-          </p:cNvSpPr>
-          <p:nvPr>
-            <p:ph idx="1"/>
-          </p:nvPr>
-        </p:nvSpPr>
-        <p:spPr/>
-        <p:txBody>
-          <a:bodyPr/>
-          <a:lstStyle/>
-          <a:p>
-            <a:r>
-              <a:rPr lang="en-PH" dirty="0" smtClean="0"/>
-              <a:t>Landing Page</a:t>
-            </a:r>
-          </a:p>
-          <a:p>
-            <a:r>
-              <a:rPr lang="en-PH" dirty="0" smtClean="0"/>
-              <a:t>Login/Sign-up Page</a:t>
-            </a:r>
-          </a:p>
-          <a:p>
-            <a:r>
-              <a:rPr lang="en-PH" dirty="0" smtClean="0"/>
-              <a:t>Create Patient’s Profile Page</a:t>
-            </a:r>
-          </a:p>
-          <a:p>
-            <a:r>
-              <a:rPr lang="en-PH" dirty="0" smtClean="0"/>
-              <a:t>Terms and Conditions Page</a:t>
-            </a:r>
-          </a:p>
-          <a:p>
-            <a:r>
-              <a:rPr lang="en-PH" dirty="0" smtClean="0"/>
-              <a:t>Home Page</a:t>
-            </a:r>
-          </a:p>
-          <a:p>
-            <a:endParaRPr lang="en-PH" dirty="0"/>
-          </a:p>
-        </p:txBody>
-      </p:sp>
-    </p:spTree>
-    <p:extLst>
-      <p:ext uri="{BB962C8B-B14F-4D97-AF65-F5344CB8AC3E}">
-        <p14:creationId xmlns:p14="http://schemas.microsoft.com/office/powerpoint/2010/main" val="4215176507"/>
-      </p:ext>
-    </p:extLst>
-  </p:cSld>
-  <p:clrMapOvr>
-    <a:masterClrMapping/>
-  </p:clrMapOvr>
-</p:sld>
-</file>
-
-<file path=ppt/slides/slide5.xml><?xml version="1.0" encoding="utf-8"?>
-<p:sld xmlns:a="http://schemas.openxmlformats.org/drawingml/2006/main" xmlns:r="http://schemas.openxmlformats.org/officeDocument/2006/relationships" xmlns:p="http://schemas.openxmlformats.org/presentationml/2006/main">
-  <p:cSld>
-    <p:spTree>
-      <p:nvGrpSpPr>
-        <p:cNvPr id="1" name=""/>
-        <p:cNvGrpSpPr/>
-        <p:nvPr/>
-      </p:nvGrpSpPr>
-      <p:grpSpPr>
-        <a:xfrm>
-          <a:off x="0" y="0"/>
-          <a:ext cx="0" cy="0"/>
-          <a:chOff x="0" y="0"/>
-          <a:chExt cx="0" cy="0"/>
-        </a:xfrm>
-      </p:grpSpPr>
-      <p:sp>
-        <p:nvSpPr>
-          <p:cNvPr id="2" name="Title 1"/>
-          <p:cNvSpPr>
-            <a:spLocks noGrp="1"/>
-          </p:cNvSpPr>
-          <p:nvPr>
-            <p:ph type="title"/>
-          </p:nvPr>
-        </p:nvSpPr>
-        <p:spPr/>
-        <p:txBody>
-          <a:bodyPr/>
-          <a:lstStyle/>
-          <a:p>
-            <a:r>
-              <a:rPr lang="en-PH" dirty="0" smtClean="0"/>
-              <a:t>Resources</a:t>
-            </a:r>
-            <a:endParaRPr lang="en-PH" dirty="0"/>
-          </a:p>
-        </p:txBody>
-      </p:sp>
-      <p:sp>
-        <p:nvSpPr>
-          <p:cNvPr id="3" name="Content Placeholder 2"/>
-          <p:cNvSpPr>
-            <a:spLocks noGrp="1"/>
-          </p:cNvSpPr>
-          <p:nvPr>
-            <p:ph idx="1"/>
-          </p:nvPr>
-        </p:nvSpPr>
-        <p:spPr/>
-        <p:txBody>
-          <a:bodyPr/>
-          <a:lstStyle/>
-          <a:p>
-            <a:pPr marL="0" indent="0">
-              <a:buNone/>
-            </a:pPr>
-            <a:r>
-              <a:rPr lang="en-PH" dirty="0"/>
-              <a:t>Icons - https://icons8.com/</a:t>
-            </a:r>
-          </a:p>
-        </p:txBody>
-      </p:sp>
-    </p:spTree>
-    <p:extLst>
-      <p:ext uri="{BB962C8B-B14F-4D97-AF65-F5344CB8AC3E}">
-        <p14:creationId xmlns:p14="http://schemas.microsoft.com/office/powerpoint/2010/main" val="3668923973"/>
-      </p:ext>
-    </p:extLst>
-  </p:cSld>
-  <p:clrMapOvr>
-    <a:masterClrMapping/>
-  </p:clrMapOvr>
-</p:sld>
-</file>
-
-<file path=ppt/slides/slide6.xml><?xml version="1.0" encoding="utf-8"?>
-<p:sld xmlns:a="http://schemas.openxmlformats.org/drawingml/2006/main" xmlns:r="http://schemas.openxmlformats.org/officeDocument/2006/relationships" xmlns:p="http://schemas.openxmlformats.org/presentationml/2006/main">
-  <p:cSld>
-    <p:spTree>
-      <p:nvGrpSpPr>
-        <p:cNvPr id="1" name=""/>
-        <p:cNvGrpSpPr/>
-        <p:nvPr/>
-      </p:nvGrpSpPr>
-      <p:grpSpPr>
-        <a:xfrm>
-          <a:off x="0" y="0"/>
-          <a:ext cx="0" cy="0"/>
-          <a:chOff x="0" y="0"/>
-          <a:chExt cx="0" cy="0"/>
-        </a:xfrm>
-      </p:grpSpPr>
-      <p:sp>
-        <p:nvSpPr>
-          <p:cNvPr id="2" name="Title 1"/>
-          <p:cNvSpPr>
-            <a:spLocks noGrp="1"/>
-          </p:cNvSpPr>
-          <p:nvPr>
-            <p:ph type="title"/>
-          </p:nvPr>
-        </p:nvSpPr>
-        <p:spPr/>
-        <p:txBody>
-          <a:bodyPr/>
-          <a:lstStyle/>
-          <a:p>
-            <a:r>
-              <a:rPr lang="en-PH" dirty="0" smtClean="0"/>
-              <a:t>Diagrams</a:t>
-            </a:r>
-            <a:endParaRPr lang="en-PH" dirty="0"/>
-          </a:p>
-        </p:txBody>
-      </p:sp>
-      <p:sp>
-        <p:nvSpPr>
-          <p:cNvPr id="3" name="Content Placeholder 2"/>
-          <p:cNvSpPr>
-            <a:spLocks noGrp="1"/>
-          </p:cNvSpPr>
-          <p:nvPr>
-            <p:ph idx="1"/>
-          </p:nvPr>
-        </p:nvSpPr>
-        <p:spPr/>
-        <p:txBody>
-          <a:bodyPr/>
-          <a:lstStyle/>
-          <a:p>
-            <a:r>
-              <a:rPr lang="en-PH" dirty="0" smtClean="0"/>
-              <a:t>Entity Relationship Diagram</a:t>
-            </a:r>
-          </a:p>
-          <a:p>
-            <a:r>
-              <a:rPr lang="en-PH" dirty="0" smtClean="0"/>
-              <a:t>Unified Modeling Language</a:t>
-            </a:r>
-          </a:p>
-          <a:p>
-            <a:r>
-              <a:rPr lang="en-PH" smtClean="0"/>
-              <a:t>User Stories</a:t>
-            </a:r>
-            <a:endParaRPr lang="en-PH" dirty="0" smtClean="0"/>
-          </a:p>
-        </p:txBody>
-      </p:sp>
-    </p:spTree>
-    <p:extLst>
-      <p:ext uri="{BB962C8B-B14F-4D97-AF65-F5344CB8AC3E}">
-        <p14:creationId xmlns:p14="http://schemas.microsoft.com/office/powerpoint/2010/main" val="1054607159"/>
-      </p:ext>
-    </p:extLst>
-  </p:cSld>
-  <p:clrMapOvr>
-    <a:masterClrMapping/>
-  </p:clrMapOvr>
-</p:sld>
-</file>
-
-<file path=ppt/slides/slide7.xml><?xml version="1.0" encoding="utf-8"?>
-<p:sld xmlns:a="http://schemas.openxmlformats.org/drawingml/2006/main" xmlns:r="http://schemas.openxmlformats.org/officeDocument/2006/relationships" xmlns:p="http://schemas.openxmlformats.org/presentationml/2006/main">
-  <p:cSld>
-    <p:spTree>
-      <p:nvGrpSpPr>
-        <p:cNvPr id="1" name=""/>
-        <p:cNvGrpSpPr/>
-        <p:nvPr/>
-      </p:nvGrpSpPr>
-      <p:grpSpPr>
-        <a:xfrm>
-          <a:off x="0" y="0"/>
-          <a:ext cx="0" cy="0"/>
-          <a:chOff x="0" y="0"/>
-          <a:chExt cx="0" cy="0"/>
-        </a:xfrm>
-      </p:grpSpPr>
-      <p:sp>
-        <p:nvSpPr>
-          <p:cNvPr id="2" name="Title 1"/>
-          <p:cNvSpPr>
-            <a:spLocks noGrp="1"/>
-          </p:cNvSpPr>
-          <p:nvPr>
-            <p:ph type="title"/>
-          </p:nvPr>
-        </p:nvSpPr>
-        <p:spPr/>
-        <p:txBody>
-          <a:bodyPr/>
-          <a:lstStyle/>
-          <a:p>
-            <a:endParaRPr lang="en-PH"/>
-          </a:p>
-        </p:txBody>
-      </p:sp>
-      <p:sp>
-        <p:nvSpPr>
-          <p:cNvPr id="3" name="Content Placeholder 2"/>
-          <p:cNvSpPr>
-            <a:spLocks noGrp="1"/>
-          </p:cNvSpPr>
-          <p:nvPr>
-            <p:ph idx="1"/>
-          </p:nvPr>
-        </p:nvSpPr>
-        <p:spPr/>
-        <p:txBody>
-          <a:bodyPr/>
-          <a:lstStyle/>
-          <a:p>
-            <a:endParaRPr lang="en-PH"/>
-          </a:p>
-        </p:txBody>
-      </p:sp>
-    </p:spTree>
-    <p:extLst>
-      <p:ext uri="{BB962C8B-B14F-4D97-AF65-F5344CB8AC3E}">
-        <p14:creationId xmlns:p14="http://schemas.microsoft.com/office/powerpoint/2010/main" val="3714304726"/>
-      </p:ext>
-    </p:extLst>
-  </p:cSld>
-  <p:clrMapOvr>
-    <a:masterClrMapping/>
-  </p:clrMapOvr>
-</p:sld>
-</file>
-
-<file path=ppt/slides/slide8.xml><?xml version="1.0" encoding="utf-8"?>
-<p:sld xmlns:a="http://schemas.openxmlformats.org/drawingml/2006/main" xmlns:r="http://schemas.openxmlformats.org/officeDocument/2006/relationships" xmlns:p="http://schemas.openxmlformats.org/presentationml/2006/main">
-  <p:cSld>
-    <p:spTree>
-      <p:nvGrpSpPr>
-        <p:cNvPr id="1" name=""/>
-        <p:cNvGrpSpPr/>
-        <p:nvPr/>
-      </p:nvGrpSpPr>
-      <p:grpSpPr>
-        <a:xfrm>
-          <a:off x="0" y="0"/>
-          <a:ext cx="0" cy="0"/>
-          <a:chOff x="0" y="0"/>
-          <a:chExt cx="0" cy="0"/>
-        </a:xfrm>
-      </p:grpSpPr>
-      <p:sp>
-        <p:nvSpPr>
-          <p:cNvPr id="2" name="Title 1"/>
-          <p:cNvSpPr>
-            <a:spLocks noGrp="1"/>
-          </p:cNvSpPr>
-          <p:nvPr>
-            <p:ph type="title"/>
-          </p:nvPr>
-        </p:nvSpPr>
-        <p:spPr/>
-        <p:txBody>
-          <a:bodyPr/>
-          <a:lstStyle/>
-          <a:p>
-            <a:r>
-              <a:rPr lang="en-PH" dirty="0" smtClean="0"/>
-              <a:t>Struggles</a:t>
-            </a:r>
-            <a:endParaRPr lang="en-PH" dirty="0"/>
-          </a:p>
-        </p:txBody>
-      </p:sp>
-      <p:sp>
-        <p:nvSpPr>
-          <p:cNvPr id="3" name="Content Placeholder 2"/>
-          <p:cNvSpPr>
-            <a:spLocks noGrp="1"/>
-          </p:cNvSpPr>
-          <p:nvPr>
-            <p:ph idx="1"/>
-          </p:nvPr>
-        </p:nvSpPr>
-        <p:spPr/>
-        <p:txBody>
-          <a:bodyPr/>
-          <a:lstStyle/>
-          <a:p>
-            <a:r>
-              <a:rPr lang="en-PH" dirty="0" smtClean="0"/>
-              <a:t>Conceptualizing the UI to suit the Physicians way of thinking. I have to think like a Phsician for a day to come up with the desired visual communication by a Physician (atleast on my perception).</a:t>
-            </a:r>
-          </a:p>
-          <a:p>
-            <a:endParaRPr lang="en-PH" dirty="0"/>
-          </a:p>
-        </p:txBody>
-      </p:sp>
-    </p:spTree>
-    <p:extLst>
-      <p:ext uri="{BB962C8B-B14F-4D97-AF65-F5344CB8AC3E}">
-        <p14:creationId xmlns:p14="http://schemas.microsoft.com/office/powerpoint/2010/main" val="3316617663"/>
-      </p:ext>
-    </p:extLst>
-  </p:cSld>
-  <p:clrMapOvr>
-    <a:masterClrMapping/>
-  </p:clrMapOvr>
-</p:sld>
-</file>
-
-<file path=ppt/slides/slide9.xml><?xml version="1.0" encoding="utf-8"?>
-<p:sld xmlns:a="http://schemas.openxmlformats.org/drawingml/2006/main" xmlns:r="http://schemas.openxmlformats.org/officeDocument/2006/relationships" xmlns:p="http://schemas.openxmlformats.org/presentationml/2006/main">
-  <p:cSld>
-    <p:spTree>
-      <p:nvGrpSpPr>
-        <p:cNvPr id="1" name=""/>
-        <p:cNvGrpSpPr/>
-        <p:nvPr/>
-      </p:nvGrpSpPr>
-      <p:grpSpPr>
-        <a:xfrm>
-          <a:off x="0" y="0"/>
-          <a:ext cx="0" cy="0"/>
-          <a:chOff x="0" y="0"/>
-          <a:chExt cx="0" cy="0"/>
-        </a:xfrm>
-      </p:grpSpPr>
-      <p:sp>
-        <p:nvSpPr>
-          <p:cNvPr id="2" name="Title 1"/>
-          <p:cNvSpPr>
-            <a:spLocks noGrp="1"/>
-          </p:cNvSpPr>
-          <p:nvPr>
-            <p:ph type="title"/>
-          </p:nvPr>
-        </p:nvSpPr>
-        <p:spPr/>
-        <p:txBody>
-          <a:bodyPr/>
-          <a:lstStyle/>
-          <a:p>
-            <a:r>
-              <a:rPr lang="en-PH" dirty="0" smtClean="0"/>
-              <a:t>Learnings</a:t>
-            </a:r>
-            <a:endParaRPr lang="en-PH" dirty="0"/>
-          </a:p>
-        </p:txBody>
-      </p:sp>
-      <p:sp>
-        <p:nvSpPr>
-          <p:cNvPr id="3" name="Content Placeholder 2"/>
-          <p:cNvSpPr>
-            <a:spLocks noGrp="1"/>
-          </p:cNvSpPr>
-          <p:nvPr>
-            <p:ph idx="1"/>
-          </p:nvPr>
-        </p:nvSpPr>
-        <p:spPr/>
-        <p:txBody>
-          <a:bodyPr/>
-          <a:lstStyle/>
-          <a:p>
-            <a:endParaRPr lang="en-PH" dirty="0"/>
-          </a:p>
-        </p:txBody>
-      </p:sp>
-    </p:spTree>
-    <p:extLst>
-      <p:ext uri="{BB962C8B-B14F-4D97-AF65-F5344CB8AC3E}">
-        <p14:creationId xmlns:p14="http://schemas.microsoft.com/office/powerpoint/2010/main" val="2373873668"/>
+        <p14:creationId xmlns:p14="http://schemas.microsoft.com/office/powerpoint/2010/main" val="2562418570"/>
       </p:ext>
     </p:extLst>
   </p:cSld>

</xml_diff>